<commit_message>
Documentation and Presentation updated to match project
</commit_message>
<xml_diff>
--- a/src/main/resources/presentation/Presentation Technical Evaluation 2.pptx
+++ b/src/main/resources/presentation/Presentation Technical Evaluation 2.pptx
@@ -114,6 +114,11 @@
       </a:defRPr>
     </a:lvl9pPr>
   </p:defaultTextStyle>
+  <p:extLst>
+    <p:ext uri="{EFAFB233-063F-42B5-8137-9DF3F51BA10A}">
+      <p15:sldGuideLst xmlns:p15="http://schemas.microsoft.com/office/powerpoint/2012/main"/>
+    </p:ext>
+  </p:extLst>
 </p:presentation>
 </file>
 
@@ -330,7 +335,7 @@
           <a:p>
             <a:fld id="{C86B5A78-2CD9-4A1E-823E-49B91BA870EF}" type="datetimeFigureOut">
               <a:rPr lang="pt-BR" smtClean="0"/>
-              <a:t>22/07/2022</a:t>
+              <a:t>25/07/2022</a:t>
             </a:fld>
             <a:endParaRPr lang="pt-BR"/>
           </a:p>
@@ -621,7 +626,7 @@
           <a:p>
             <a:fld id="{C86B5A78-2CD9-4A1E-823E-49B91BA870EF}" type="datetimeFigureOut">
               <a:rPr lang="pt-BR" smtClean="0"/>
-              <a:t>22/07/2022</a:t>
+              <a:t>25/07/2022</a:t>
             </a:fld>
             <a:endParaRPr lang="pt-BR"/>
           </a:p>
@@ -880,7 +885,7 @@
           <a:p>
             <a:fld id="{C86B5A78-2CD9-4A1E-823E-49B91BA870EF}" type="datetimeFigureOut">
               <a:rPr lang="pt-BR" smtClean="0"/>
-              <a:t>22/07/2022</a:t>
+              <a:t>25/07/2022</a:t>
             </a:fld>
             <a:endParaRPr lang="pt-BR"/>
           </a:p>
@@ -1349,7 +1354,7 @@
           <a:p>
             <a:fld id="{C86B5A78-2CD9-4A1E-823E-49B91BA870EF}" type="datetimeFigureOut">
               <a:rPr lang="pt-BR" smtClean="0"/>
-              <a:t>22/07/2022</a:t>
+              <a:t>25/07/2022</a:t>
             </a:fld>
             <a:endParaRPr lang="pt-BR"/>
           </a:p>
@@ -1529,7 +1534,7 @@
           <a:p>
             <a:fld id="{C86B5A78-2CD9-4A1E-823E-49B91BA870EF}" type="datetimeFigureOut">
               <a:rPr lang="pt-BR" smtClean="0"/>
-              <a:t>22/07/2022</a:t>
+              <a:t>25/07/2022</a:t>
             </a:fld>
             <a:endParaRPr lang="pt-BR"/>
           </a:p>
@@ -2105,7 +2110,7 @@
           <a:p>
             <a:fld id="{C86B5A78-2CD9-4A1E-823E-49B91BA870EF}" type="datetimeFigureOut">
               <a:rPr lang="pt-BR" smtClean="0"/>
-              <a:t>22/07/2022</a:t>
+              <a:t>25/07/2022</a:t>
             </a:fld>
             <a:endParaRPr lang="pt-BR"/>
           </a:p>
@@ -2437,7 +2442,7 @@
           <a:p>
             <a:fld id="{C86B5A78-2CD9-4A1E-823E-49B91BA870EF}" type="datetimeFigureOut">
               <a:rPr lang="pt-BR" smtClean="0"/>
-              <a:t>22/07/2022</a:t>
+              <a:t>25/07/2022</a:t>
             </a:fld>
             <a:endParaRPr lang="pt-BR"/>
           </a:p>
@@ -2612,7 +2617,7 @@
           <a:p>
             <a:fld id="{C86B5A78-2CD9-4A1E-823E-49B91BA870EF}" type="datetimeFigureOut">
               <a:rPr lang="pt-BR" smtClean="0"/>
-              <a:t>22/07/2022</a:t>
+              <a:t>25/07/2022</a:t>
             </a:fld>
             <a:endParaRPr lang="pt-BR"/>
           </a:p>
@@ -2792,7 +2797,7 @@
           <a:p>
             <a:fld id="{C86B5A78-2CD9-4A1E-823E-49B91BA870EF}" type="datetimeFigureOut">
               <a:rPr lang="pt-BR" smtClean="0"/>
-              <a:t>22/07/2022</a:t>
+              <a:t>25/07/2022</a:t>
             </a:fld>
             <a:endParaRPr lang="pt-BR"/>
           </a:p>
@@ -2962,7 +2967,7 @@
           <a:p>
             <a:fld id="{C86B5A78-2CD9-4A1E-823E-49B91BA870EF}" type="datetimeFigureOut">
               <a:rPr lang="pt-BR" smtClean="0"/>
-              <a:t>22/07/2022</a:t>
+              <a:t>25/07/2022</a:t>
             </a:fld>
             <a:endParaRPr lang="pt-BR"/>
           </a:p>
@@ -3219,7 +3224,7 @@
           <a:p>
             <a:fld id="{C86B5A78-2CD9-4A1E-823E-49B91BA870EF}" type="datetimeFigureOut">
               <a:rPr lang="pt-BR" smtClean="0"/>
-              <a:t>22/07/2022</a:t>
+              <a:t>25/07/2022</a:t>
             </a:fld>
             <a:endParaRPr lang="pt-BR"/>
           </a:p>
@@ -3511,7 +3516,7 @@
           <a:p>
             <a:fld id="{C86B5A78-2CD9-4A1E-823E-49B91BA870EF}" type="datetimeFigureOut">
               <a:rPr lang="pt-BR" smtClean="0"/>
-              <a:t>22/07/2022</a:t>
+              <a:t>25/07/2022</a:t>
             </a:fld>
             <a:endParaRPr lang="pt-BR"/>
           </a:p>
@@ -3941,7 +3946,7 @@
           <a:p>
             <a:fld id="{C86B5A78-2CD9-4A1E-823E-49B91BA870EF}" type="datetimeFigureOut">
               <a:rPr lang="pt-BR" smtClean="0"/>
-              <a:t>22/07/2022</a:t>
+              <a:t>25/07/2022</a:t>
             </a:fld>
             <a:endParaRPr lang="pt-BR"/>
           </a:p>
@@ -4059,7 +4064,7 @@
           <a:p>
             <a:fld id="{C86B5A78-2CD9-4A1E-823E-49B91BA870EF}" type="datetimeFigureOut">
               <a:rPr lang="pt-BR" smtClean="0"/>
-              <a:t>22/07/2022</a:t>
+              <a:t>25/07/2022</a:t>
             </a:fld>
             <a:endParaRPr lang="pt-BR"/>
           </a:p>
@@ -4154,7 +4159,7 @@
           <a:p>
             <a:fld id="{C86B5A78-2CD9-4A1E-823E-49B91BA870EF}" type="datetimeFigureOut">
               <a:rPr lang="pt-BR" smtClean="0"/>
-              <a:t>22/07/2022</a:t>
+              <a:t>25/07/2022</a:t>
             </a:fld>
             <a:endParaRPr lang="pt-BR"/>
           </a:p>
@@ -4437,7 +4442,7 @@
           <a:p>
             <a:fld id="{C86B5A78-2CD9-4A1E-823E-49B91BA870EF}" type="datetimeFigureOut">
               <a:rPr lang="pt-BR" smtClean="0"/>
-              <a:t>22/07/2022</a:t>
+              <a:t>25/07/2022</a:t>
             </a:fld>
             <a:endParaRPr lang="pt-BR"/>
           </a:p>
@@ -4728,7 +4733,7 @@
           <a:p>
             <a:fld id="{C86B5A78-2CD9-4A1E-823E-49B91BA870EF}" type="datetimeFigureOut">
               <a:rPr lang="pt-BR" smtClean="0"/>
-              <a:t>22/07/2022</a:t>
+              <a:t>25/07/2022</a:t>
             </a:fld>
             <a:endParaRPr lang="pt-BR"/>
           </a:p>
@@ -4959,7 +4964,7 @@
           <a:p>
             <a:fld id="{C86B5A78-2CD9-4A1E-823E-49B91BA870EF}" type="datetimeFigureOut">
               <a:rPr lang="pt-BR" smtClean="0"/>
-              <a:t>22/07/2022</a:t>
+              <a:t>25/07/2022</a:t>
             </a:fld>
             <a:endParaRPr lang="pt-BR"/>
           </a:p>
@@ -6498,7 +6503,12 @@
             <p:ph idx="1"/>
           </p:nvPr>
         </p:nvSpPr>
-        <p:spPr/>
+        <p:spPr>
+          <a:xfrm>
+            <a:off x="1141413" y="3119175"/>
+            <a:ext cx="9905998" cy="3124201"/>
+          </a:xfrm>
+        </p:spPr>
         <p:txBody>
           <a:bodyPr/>
           <a:lstStyle/>
@@ -6510,19 +6520,35 @@
             <a:endParaRPr lang="pt-BR" dirty="0" smtClean="0"/>
           </a:p>
           <a:p>
+            <a:endParaRPr lang="pt-BR" dirty="0"/>
+          </a:p>
+          <a:p>
+            <a:r>
+              <a:rPr lang="pt-BR" dirty="0" err="1" smtClean="0"/>
+              <a:t>Read</a:t>
+            </a:r>
             <a:endParaRPr lang="pt-BR" dirty="0" smtClean="0"/>
           </a:p>
           <a:p>
             <a:endParaRPr lang="pt-BR" dirty="0"/>
           </a:p>
           <a:p>
+            <a:r>
+              <a:rPr lang="pt-BR" dirty="0" smtClean="0"/>
+              <a:t>Update</a:t>
+            </a:r>
+          </a:p>
+          <a:p>
+            <a:endParaRPr lang="pt-BR" dirty="0" smtClean="0"/>
+          </a:p>
+          <a:p>
+            <a:r>
+              <a:rPr lang="pt-BR" dirty="0" smtClean="0"/>
+              <a:t>Delete</a:t>
+            </a:r>
             <a:endParaRPr lang="pt-BR" dirty="0"/>
           </a:p>
           <a:p>
-            <a:r>
-              <a:rPr lang="pt-BR" dirty="0" err="1" smtClean="0"/>
-              <a:t>update</a:t>
-            </a:r>
             <a:endParaRPr lang="pt-BR" dirty="0" smtClean="0"/>
           </a:p>
           <a:p>

</xml_diff>